<commit_message>
day 1 is complete
</commit_message>
<xml_diff>
--- a/day-1/iam.pptx
+++ b/day-1/iam.pptx
@@ -5,16 +5,17 @@
     <p:sldMasterId id="2147483648" r:id="rId1"/>
   </p:sldMasterIdLst>
   <p:notesMasterIdLst>
-    <p:notesMasterId r:id="rId9"/>
+    <p:notesMasterId r:id="rId10"/>
   </p:notesMasterIdLst>
   <p:sldIdLst>
     <p:sldId id="256" r:id="rId2"/>
     <p:sldId id="257" r:id="rId3"/>
-    <p:sldId id="258" r:id="rId4"/>
-    <p:sldId id="259" r:id="rId5"/>
-    <p:sldId id="260" r:id="rId6"/>
-    <p:sldId id="261" r:id="rId7"/>
-    <p:sldId id="262" r:id="rId8"/>
+    <p:sldId id="263" r:id="rId4"/>
+    <p:sldId id="258" r:id="rId5"/>
+    <p:sldId id="259" r:id="rId6"/>
+    <p:sldId id="260" r:id="rId7"/>
+    <p:sldId id="261" r:id="rId8"/>
+    <p:sldId id="262" r:id="rId9"/>
   </p:sldIdLst>
   <p:sldSz cx="12192000" cy="6858000"/>
   <p:notesSz cx="6858000" cy="9144000"/>
@@ -203,7 +204,7 @@
           <a:p>
             <a:fld id="{C463E0E3-9AD0-0B47-ABCF-17825E4328FF}" type="datetimeFigureOut">
               <a:rPr lang="en-US" smtClean="0"/>
-              <a:t>6/1/20</a:t>
+              <a:t>6/4/20</a:t>
             </a:fld>
             <a:endParaRPr lang="en-US"/>
           </a:p>
@@ -610,7 +611,7 @@
           <a:p>
             <a:fld id="{5C2E5DCD-7808-5E44-9742-E0BCD320E54E}" type="slidenum">
               <a:rPr lang="en-US" smtClean="0"/>
-              <a:t>4</a:t>
+              <a:t>5</a:t>
             </a:fld>
             <a:endParaRPr lang="en-US"/>
           </a:p>
@@ -704,7 +705,7 @@
           <a:p>
             <a:fld id="{5C2E5DCD-7808-5E44-9742-E0BCD320E54E}" type="slidenum">
               <a:rPr lang="en-US" smtClean="0"/>
-              <a:t>6</a:t>
+              <a:t>7</a:t>
             </a:fld>
             <a:endParaRPr lang="en-US"/>
           </a:p>
@@ -818,7 +819,7 @@
           <a:effectLst/>
           <a:extLst>
             <a:ext uri="{91240B29-F687-4f45-9708-019B960494DF}">
-              <a14:hiddenLine xmlns="" xmlns:a14="http://schemas.microsoft.com/office/drawing/2010/main" w="9525">
+              <a14:hiddenLine xmlns:a14="http://schemas.microsoft.com/office/drawing/2010/main" xmlns="" w="9525">
                 <a:solidFill>
                   <a:srgbClr val="000000"/>
                 </a:solidFill>
@@ -1011,7 +1012,7 @@
             <a:fld id="{08B9EBBA-996F-894A-B54A-D6246ED52CEA}" type="datetimeFigureOut">
               <a:rPr lang="en-US" dirty="0"/>
               <a:pPr/>
-              <a:t>6/1/20</a:t>
+              <a:t>6/4/20</a:t>
             </a:fld>
             <a:endParaRPr lang="en-US" dirty="0"/>
           </a:p>
@@ -1326,7 +1327,7 @@
             <a:fld id="{18C79C5D-2A6F-F04D-97DA-BEF2467B64E4}" type="datetimeFigureOut">
               <a:rPr lang="en-US" dirty="0"/>
               <a:pPr/>
-              <a:t>6/1/20</a:t>
+              <a:t>6/4/20</a:t>
             </a:fld>
             <a:endParaRPr lang="en-US" dirty="0"/>
           </a:p>
@@ -1811,7 +1812,7 @@
             <a:fld id="{8DFA1846-DA80-1C48-A609-854EA85C59AD}" type="datetimeFigureOut">
               <a:rPr lang="en-US" dirty="0"/>
               <a:pPr/>
-              <a:t>6/1/20</a:t>
+              <a:t>6/4/20</a:t>
             </a:fld>
             <a:endParaRPr lang="en-US" dirty="0"/>
           </a:p>
@@ -2177,7 +2178,7 @@
             <a:fld id="{FBF54567-0DE4-3F47-BF90-CB84690072F9}" type="datetimeFigureOut">
               <a:rPr lang="en-US" dirty="0"/>
               <a:pPr/>
-              <a:t>6/1/20</a:t>
+              <a:t>6/4/20</a:t>
             </a:fld>
             <a:endParaRPr lang="en-US" dirty="0"/>
           </a:p>
@@ -2328,7 +2329,7 @@
           <a:ln/>
           <a:extLst>
             <a:ext uri="{91240B29-F687-4f45-9708-019B960494DF}">
-              <a14:hiddenLine xmlns="" xmlns:a14="http://schemas.microsoft.com/office/drawing/2010/main" w="9525">
+              <a14:hiddenLine xmlns:a14="http://schemas.microsoft.com/office/drawing/2010/main" xmlns="" w="9525">
                 <a:solidFill>
                   <a:srgbClr val="000000"/>
                 </a:solidFill>
@@ -2447,7 +2448,7 @@
             <a:fld id="{C6C52C72-DE31-F449-A4ED-4C594FD91407}" type="datetimeFigureOut">
               <a:rPr lang="en-US" dirty="0"/>
               <a:pPr/>
-              <a:t>6/1/20</a:t>
+              <a:t>6/4/20</a:t>
             </a:fld>
             <a:endParaRPr lang="en-US" dirty="0"/>
           </a:p>
@@ -2600,7 +2601,7 @@
           <a:ln/>
           <a:extLst>
             <a:ext uri="{91240B29-F687-4f45-9708-019B960494DF}">
-              <a14:hiddenLine xmlns="" xmlns:a14="http://schemas.microsoft.com/office/drawing/2010/main" w="9525">
+              <a14:hiddenLine xmlns:a14="http://schemas.microsoft.com/office/drawing/2010/main" xmlns="" w="9525">
                 <a:solidFill>
                   <a:srgbClr val="000000"/>
                 </a:solidFill>
@@ -2729,7 +2730,7 @@
             <a:fld id="{ED62726E-379B-B349-9EED-81ED093FA806}" type="datetimeFigureOut">
               <a:rPr lang="en-US" dirty="0"/>
               <a:pPr/>
-              <a:t>6/1/20</a:t>
+              <a:t>6/4/20</a:t>
             </a:fld>
             <a:endParaRPr lang="en-US" dirty="0"/>
           </a:p>
@@ -2880,7 +2881,7 @@
           <a:ln/>
           <a:extLst>
             <a:ext uri="{91240B29-F687-4f45-9708-019B960494DF}">
-              <a14:hiddenLine xmlns="" xmlns:a14="http://schemas.microsoft.com/office/drawing/2010/main" w="9525">
+              <a14:hiddenLine xmlns:a14="http://schemas.microsoft.com/office/drawing/2010/main" xmlns="" w="9525">
                 <a:solidFill>
                   <a:srgbClr val="000000"/>
                 </a:solidFill>
@@ -3009,7 +3010,7 @@
             <a:fld id="{9B3A1323-8D79-1946-B0D7-40001CF92E9D}" type="datetimeFigureOut">
               <a:rPr lang="en-US" dirty="0"/>
               <a:pPr/>
-              <a:t>6/1/20</a:t>
+              <a:t>6/4/20</a:t>
             </a:fld>
             <a:endParaRPr lang="en-US" dirty="0"/>
           </a:p>
@@ -3349,7 +3350,7 @@
             <a:fld id="{8DFA1846-DA80-1C48-A609-854EA85C59AD}" type="datetimeFigureOut">
               <a:rPr lang="en-US" dirty="0"/>
               <a:pPr/>
-              <a:t>6/1/20</a:t>
+              <a:t>6/4/20</a:t>
             </a:fld>
             <a:endParaRPr lang="en-US" dirty="0"/>
           </a:p>
@@ -3500,7 +3501,7 @@
           <a:ln/>
           <a:extLst>
             <a:ext uri="{91240B29-F687-4f45-9708-019B960494DF}">
-              <a14:hiddenLine xmlns="" xmlns:a14="http://schemas.microsoft.com/office/drawing/2010/main" w="9525">
+              <a14:hiddenLine xmlns:a14="http://schemas.microsoft.com/office/drawing/2010/main" xmlns="" w="9525">
                 <a:solidFill>
                   <a:srgbClr val="000000"/>
                 </a:solidFill>
@@ -3685,7 +3686,7 @@
             <a:fld id="{57302355-E14B-8545-A8F8-0FE83CC9D524}" type="datetimeFigureOut">
               <a:rPr lang="en-US" dirty="0"/>
               <a:pPr/>
-              <a:t>6/1/20</a:t>
+              <a:t>6/4/20</a:t>
             </a:fld>
             <a:endParaRPr lang="en-US" dirty="0"/>
           </a:p>
@@ -3836,7 +3837,7 @@
           <a:ln/>
           <a:extLst>
             <a:ext uri="{91240B29-F687-4f45-9708-019B960494DF}">
-              <a14:hiddenLine xmlns="" xmlns:a14="http://schemas.microsoft.com/office/drawing/2010/main" w="9525">
+              <a14:hiddenLine xmlns:a14="http://schemas.microsoft.com/office/drawing/2010/main" xmlns="" w="9525">
                 <a:solidFill>
                   <a:srgbClr val="000000"/>
                 </a:solidFill>
@@ -4159,7 +4160,7 @@
             <a:fld id="{02640F58-564D-2B4F-AE67-E407BA4FCF45}" type="datetimeFigureOut">
               <a:rPr lang="en-US" dirty="0"/>
               <a:pPr/>
-              <a:t>6/1/20</a:t>
+              <a:t>6/4/20</a:t>
             </a:fld>
             <a:endParaRPr lang="en-US" dirty="0"/>
           </a:p>
@@ -4310,7 +4311,7 @@
           <a:ln/>
           <a:extLst>
             <a:ext uri="{91240B29-F687-4f45-9708-019B960494DF}">
-              <a14:hiddenLine xmlns="" xmlns:a14="http://schemas.microsoft.com/office/drawing/2010/main" w="9525">
+              <a14:hiddenLine xmlns:a14="http://schemas.microsoft.com/office/drawing/2010/main" xmlns="" w="9525">
                 <a:solidFill>
                   <a:srgbClr val="000000"/>
                 </a:solidFill>
@@ -4377,7 +4378,7 @@
             <a:fld id="{F13A34C8-038E-2045-AF43-DF7DBB8E0E9E}" type="datetimeFigureOut">
               <a:rPr lang="en-US" dirty="0"/>
               <a:pPr/>
-              <a:t>6/1/20</a:t>
+              <a:t>6/4/20</a:t>
             </a:fld>
             <a:endParaRPr lang="en-US" dirty="0"/>
           </a:p>
@@ -4469,7 +4470,7 @@
             <a:fld id="{8818C68F-D26B-8F47-958C-23B49CF8A634}" type="datetimeFigureOut">
               <a:rPr lang="en-US" dirty="0"/>
               <a:pPr/>
-              <a:t>6/1/20</a:t>
+              <a:t>6/4/20</a:t>
             </a:fld>
             <a:endParaRPr lang="en-US" dirty="0"/>
           </a:p>
@@ -4733,7 +4734,7 @@
           <a:ln/>
           <a:extLst>
             <a:ext uri="{91240B29-F687-4f45-9708-019B960494DF}">
-              <a14:hiddenLine xmlns="" xmlns:a14="http://schemas.microsoft.com/office/drawing/2010/main" w="9525">
+              <a14:hiddenLine xmlns:a14="http://schemas.microsoft.com/office/drawing/2010/main" xmlns="" w="9525">
                 <a:solidFill>
                   <a:srgbClr val="000000"/>
                 </a:solidFill>
@@ -4933,7 +4934,7 @@
             <a:fld id="{D0DF5E60-9974-AC48-9591-99C2BB44B7CF}" type="datetimeFigureOut">
               <a:rPr lang="en-US" dirty="0"/>
               <a:pPr/>
-              <a:t>6/1/20</a:t>
+              <a:t>6/4/20</a:t>
             </a:fld>
             <a:endParaRPr lang="en-US" dirty="0"/>
           </a:p>
@@ -5243,7 +5244,7 @@
             <a:fld id="{18C79C5D-2A6F-F04D-97DA-BEF2467B64E4}" type="datetimeFigureOut">
               <a:rPr lang="en-US" dirty="0"/>
               <a:pPr/>
-              <a:t>6/1/20</a:t>
+              <a:t>6/4/20</a:t>
             </a:fld>
             <a:endParaRPr lang="en-US" dirty="0"/>
           </a:p>
@@ -5510,7 +5511,7 @@
             <a:fld id="{09B482E8-6E0E-1B4F-B1FD-C69DB9E858D9}" type="datetimeFigureOut">
               <a:rPr lang="en-US" dirty="0"/>
               <a:pPr/>
-              <a:t>6/1/20</a:t>
+              <a:t>6/4/20</a:t>
             </a:fld>
             <a:endParaRPr lang="en-US" dirty="0"/>
           </a:p>
@@ -6354,6 +6355,583 @@
 <file path=ppt/slides/slide3.xml><?xml version="1.0" encoding="utf-8"?>
 <p:sld xmlns:a="http://schemas.openxmlformats.org/drawingml/2006/main" xmlns:r="http://schemas.openxmlformats.org/officeDocument/2006/relationships" xmlns:p="http://schemas.openxmlformats.org/presentationml/2006/main">
   <p:cSld>
+    <p:spTree>
+      <p:nvGrpSpPr>
+        <p:cNvPr id="1" name=""/>
+        <p:cNvGrpSpPr/>
+        <p:nvPr/>
+      </p:nvGrpSpPr>
+      <p:grpSpPr>
+        <a:xfrm>
+          <a:off x="0" y="0"/>
+          <a:ext cx="0" cy="0"/>
+          <a:chOff x="0" y="0"/>
+          <a:chExt cx="0" cy="0"/>
+        </a:xfrm>
+      </p:grpSpPr>
+      <p:sp>
+        <p:nvSpPr>
+          <p:cNvPr id="2" name="Title 1">
+            <a:extLst>
+              <a:ext uri="{FF2B5EF4-FFF2-40B4-BE49-F238E27FC236}">
+                <a16:creationId xmlns:a16="http://schemas.microsoft.com/office/drawing/2014/main" id="{46AC6AAE-E1D6-E540-A947-09F4D1253580}"/>
+              </a:ext>
+            </a:extLst>
+          </p:cNvPr>
+          <p:cNvSpPr>
+            <a:spLocks noGrp="1"/>
+          </p:cNvSpPr>
+          <p:nvPr>
+            <p:ph type="title"/>
+          </p:nvPr>
+        </p:nvSpPr>
+        <p:spPr/>
+        <p:txBody>
+          <a:bodyPr/>
+          <a:lstStyle/>
+          <a:p>
+            <a:r>
+              <a:rPr lang="en-US" dirty="0"/>
+              <a:t>IAM Policies</a:t>
+            </a:r>
+          </a:p>
+        </p:txBody>
+      </p:sp>
+      <p:sp>
+        <p:nvSpPr>
+          <p:cNvPr id="3" name="Content Placeholder 2">
+            <a:extLst>
+              <a:ext uri="{FF2B5EF4-FFF2-40B4-BE49-F238E27FC236}">
+                <a16:creationId xmlns:a16="http://schemas.microsoft.com/office/drawing/2014/main" id="{E57E8996-D385-9C43-AADC-F6F39035A129}"/>
+              </a:ext>
+            </a:extLst>
+          </p:cNvPr>
+          <p:cNvSpPr>
+            <a:spLocks noGrp="1"/>
+          </p:cNvSpPr>
+          <p:nvPr>
+            <p:ph idx="1"/>
+          </p:nvPr>
+        </p:nvSpPr>
+        <p:spPr>
+          <a:xfrm>
+            <a:off x="818712" y="2222287"/>
+            <a:ext cx="2940488" cy="3636511"/>
+          </a:xfrm>
+        </p:spPr>
+        <p:txBody>
+          <a:bodyPr/>
+          <a:lstStyle/>
+          <a:p>
+            <a:r>
+              <a:rPr lang="en-US" dirty="0"/>
+              <a:t>Policies define the specifics of who/what can access AWS resource/s and how</a:t>
+            </a:r>
+          </a:p>
+          <a:p>
+            <a:r>
+              <a:rPr lang="en-US" dirty="0"/>
+              <a:t>AWS has predefined policies or you can make your own</a:t>
+            </a:r>
+          </a:p>
+          <a:p>
+            <a:endParaRPr lang="en-US" dirty="0"/>
+          </a:p>
+        </p:txBody>
+      </p:sp>
+      <p:sp>
+        <p:nvSpPr>
+          <p:cNvPr id="4" name="TextBox 3">
+            <a:extLst>
+              <a:ext uri="{FF2B5EF4-FFF2-40B4-BE49-F238E27FC236}">
+                <a16:creationId xmlns:a16="http://schemas.microsoft.com/office/drawing/2014/main" id="{2843B23E-C11F-6641-9156-F1BD897F2647}"/>
+              </a:ext>
+            </a:extLst>
+          </p:cNvPr>
+          <p:cNvSpPr txBox="1"/>
+          <p:nvPr/>
+        </p:nvSpPr>
+        <p:spPr>
+          <a:xfrm>
+            <a:off x="6248400" y="2387600"/>
+            <a:ext cx="184731" cy="369332"/>
+          </a:xfrm>
+          <a:prstGeom prst="rect">
+            <a:avLst/>
+          </a:prstGeom>
+          <a:noFill/>
+        </p:spPr>
+        <p:txBody>
+          <a:bodyPr wrap="none" rtlCol="0">
+            <a:spAutoFit/>
+          </a:bodyPr>
+          <a:lstStyle/>
+          <a:p>
+            <a:endParaRPr lang="en-US" dirty="0"/>
+          </a:p>
+        </p:txBody>
+      </p:sp>
+      <p:pic>
+        <p:nvPicPr>
+          <p:cNvPr id="6" name="Picture 5" descr="A close up of a map&#10;&#10;Description automatically generated">
+            <a:extLst>
+              <a:ext uri="{FF2B5EF4-FFF2-40B4-BE49-F238E27FC236}">
+                <a16:creationId xmlns:a16="http://schemas.microsoft.com/office/drawing/2014/main" id="{16D537AF-1389-D84B-A6DA-5273BD4451EB}"/>
+              </a:ext>
+            </a:extLst>
+          </p:cNvPr>
+          <p:cNvPicPr>
+            <a:picLocks noChangeAspect="1"/>
+          </p:cNvPicPr>
+          <p:nvPr/>
+        </p:nvPicPr>
+        <p:blipFill>
+          <a:blip r:embed="rId2"/>
+          <a:stretch>
+            <a:fillRect/>
+          </a:stretch>
+        </p:blipFill>
+        <p:spPr>
+          <a:xfrm>
+            <a:off x="4400782" y="337498"/>
+            <a:ext cx="7219718" cy="5783902"/>
+          </a:xfrm>
+          <a:prstGeom prst="rect">
+            <a:avLst/>
+          </a:prstGeom>
+        </p:spPr>
+      </p:pic>
+      <p:cxnSp>
+        <p:nvCxnSpPr>
+          <p:cNvPr id="8" name="Straight Connector 7">
+            <a:extLst>
+              <a:ext uri="{FF2B5EF4-FFF2-40B4-BE49-F238E27FC236}">
+                <a16:creationId xmlns:a16="http://schemas.microsoft.com/office/drawing/2014/main" id="{2176B038-C6FC-B94A-861B-D32F9ECC3600}"/>
+              </a:ext>
+            </a:extLst>
+          </p:cNvPr>
+          <p:cNvCxnSpPr/>
+          <p:nvPr/>
+        </p:nvCxnSpPr>
+        <p:spPr>
+          <a:xfrm>
+            <a:off x="5562600" y="2438400"/>
+            <a:ext cx="1587500" cy="0"/>
+          </a:xfrm>
+          <a:prstGeom prst="line">
+            <a:avLst/>
+          </a:prstGeom>
+        </p:spPr>
+        <p:style>
+          <a:lnRef idx="3">
+            <a:schemeClr val="accent1"/>
+          </a:lnRef>
+          <a:fillRef idx="0">
+            <a:schemeClr val="accent1"/>
+          </a:fillRef>
+          <a:effectRef idx="2">
+            <a:schemeClr val="accent1"/>
+          </a:effectRef>
+          <a:fontRef idx="minor">
+            <a:schemeClr val="tx1"/>
+          </a:fontRef>
+        </p:style>
+      </p:cxnSp>
+      <p:cxnSp>
+        <p:nvCxnSpPr>
+          <p:cNvPr id="9" name="Straight Connector 8">
+            <a:extLst>
+              <a:ext uri="{FF2B5EF4-FFF2-40B4-BE49-F238E27FC236}">
+                <a16:creationId xmlns:a16="http://schemas.microsoft.com/office/drawing/2014/main" id="{542C5894-8D8D-C143-92B7-67B32EB29760}"/>
+              </a:ext>
+            </a:extLst>
+          </p:cNvPr>
+          <p:cNvCxnSpPr>
+            <a:cxnSpLocks/>
+          </p:cNvCxnSpPr>
+          <p:nvPr/>
+        </p:nvCxnSpPr>
+        <p:spPr>
+          <a:xfrm>
+            <a:off x="5689600" y="1790700"/>
+            <a:ext cx="1854200" cy="0"/>
+          </a:xfrm>
+          <a:prstGeom prst="line">
+            <a:avLst/>
+          </a:prstGeom>
+        </p:spPr>
+        <p:style>
+          <a:lnRef idx="3">
+            <a:schemeClr val="accent1"/>
+          </a:lnRef>
+          <a:fillRef idx="0">
+            <a:schemeClr val="accent1"/>
+          </a:fillRef>
+          <a:effectRef idx="2">
+            <a:schemeClr val="accent1"/>
+          </a:effectRef>
+          <a:fontRef idx="minor">
+            <a:schemeClr val="tx1"/>
+          </a:fontRef>
+        </p:style>
+      </p:cxnSp>
+      <p:cxnSp>
+        <p:nvCxnSpPr>
+          <p:cNvPr id="11" name="Straight Connector 10">
+            <a:extLst>
+              <a:ext uri="{FF2B5EF4-FFF2-40B4-BE49-F238E27FC236}">
+                <a16:creationId xmlns:a16="http://schemas.microsoft.com/office/drawing/2014/main" id="{CD46C04B-9798-6E40-96FF-482EC26C53B9}"/>
+              </a:ext>
+            </a:extLst>
+          </p:cNvPr>
+          <p:cNvCxnSpPr/>
+          <p:nvPr/>
+        </p:nvCxnSpPr>
+        <p:spPr>
+          <a:xfrm>
+            <a:off x="6096000" y="2158787"/>
+            <a:ext cx="1587500" cy="0"/>
+          </a:xfrm>
+          <a:prstGeom prst="line">
+            <a:avLst/>
+          </a:prstGeom>
+        </p:spPr>
+        <p:style>
+          <a:lnRef idx="3">
+            <a:schemeClr val="accent1"/>
+          </a:lnRef>
+          <a:fillRef idx="0">
+            <a:schemeClr val="accent1"/>
+          </a:fillRef>
+          <a:effectRef idx="2">
+            <a:schemeClr val="accent1"/>
+          </a:effectRef>
+          <a:fontRef idx="minor">
+            <a:schemeClr val="tx1"/>
+          </a:fontRef>
+        </p:style>
+      </p:cxnSp>
+      <p:sp>
+        <p:nvSpPr>
+          <p:cNvPr id="12" name="Oval 11">
+            <a:extLst>
+              <a:ext uri="{FF2B5EF4-FFF2-40B4-BE49-F238E27FC236}">
+                <a16:creationId xmlns:a16="http://schemas.microsoft.com/office/drawing/2014/main" id="{63497B0A-2712-3E4F-A048-A84BF7F6739C}"/>
+              </a:ext>
+            </a:extLst>
+          </p:cNvPr>
+          <p:cNvSpPr/>
+          <p:nvPr/>
+        </p:nvSpPr>
+        <p:spPr>
+          <a:xfrm>
+            <a:off x="6985000" y="3429000"/>
+            <a:ext cx="2387600" cy="736600"/>
+          </a:xfrm>
+          <a:prstGeom prst="ellipse">
+            <a:avLst/>
+          </a:prstGeom>
+          <a:noFill/>
+        </p:spPr>
+        <p:style>
+          <a:lnRef idx="2">
+            <a:schemeClr val="accent1">
+              <a:shade val="50000"/>
+            </a:schemeClr>
+          </a:lnRef>
+          <a:fillRef idx="1">
+            <a:schemeClr val="accent1"/>
+          </a:fillRef>
+          <a:effectRef idx="0">
+            <a:schemeClr val="accent1"/>
+          </a:effectRef>
+          <a:fontRef idx="minor">
+            <a:schemeClr val="lt1"/>
+          </a:fontRef>
+        </p:style>
+        <p:txBody>
+          <a:bodyPr rtlCol="0" anchor="ctr"/>
+          <a:lstStyle/>
+          <a:p>
+            <a:pPr algn="ctr"/>
+            <a:endParaRPr lang="en-US"/>
+          </a:p>
+        </p:txBody>
+      </p:sp>
+    </p:spTree>
+    <p:extLst>
+      <p:ext uri="{BB962C8B-B14F-4D97-AF65-F5344CB8AC3E}">
+        <p14:creationId xmlns:p14="http://schemas.microsoft.com/office/powerpoint/2010/main" val="1934890742"/>
+      </p:ext>
+    </p:extLst>
+  </p:cSld>
+  <p:clrMapOvr>
+    <a:masterClrMapping/>
+  </p:clrMapOvr>
+  <p:timing>
+    <p:tnLst>
+      <p:par>
+        <p:cTn id="1" dur="indefinite" restart="never" nodeType="tmRoot">
+          <p:childTnLst>
+            <p:seq concurrent="1" nextAc="seek">
+              <p:cTn id="2" dur="indefinite" nodeType="mainSeq">
+                <p:childTnLst>
+                  <p:par>
+                    <p:cTn id="3" fill="hold">
+                      <p:stCondLst>
+                        <p:cond delay="indefinite"/>
+                      </p:stCondLst>
+                      <p:childTnLst>
+                        <p:par>
+                          <p:cTn id="4" fill="hold">
+                            <p:stCondLst>
+                              <p:cond delay="0"/>
+                            </p:stCondLst>
+                            <p:childTnLst>
+                              <p:par>
+                                <p:cTn id="5" presetID="1" presetClass="entr" presetSubtype="0" fill="hold" nodeType="clickEffect">
+                                  <p:stCondLst>
+                                    <p:cond delay="0"/>
+                                  </p:stCondLst>
+                                  <p:childTnLst>
+                                    <p:set>
+                                      <p:cBhvr>
+                                        <p:cTn id="6" dur="1" fill="hold">
+                                          <p:stCondLst>
+                                            <p:cond delay="0"/>
+                                          </p:stCondLst>
+                                        </p:cTn>
+                                        <p:tgtEl>
+                                          <p:spTgt spid="6"/>
+                                        </p:tgtEl>
+                                        <p:attrNameLst>
+                                          <p:attrName>style.visibility</p:attrName>
+                                        </p:attrNameLst>
+                                      </p:cBhvr>
+                                      <p:to>
+                                        <p:strVal val="visible"/>
+                                      </p:to>
+                                    </p:set>
+                                  </p:childTnLst>
+                                </p:cTn>
+                              </p:par>
+                            </p:childTnLst>
+                          </p:cTn>
+                        </p:par>
+                      </p:childTnLst>
+                    </p:cTn>
+                  </p:par>
+                  <p:par>
+                    <p:cTn id="7" fill="hold">
+                      <p:stCondLst>
+                        <p:cond delay="indefinite"/>
+                      </p:stCondLst>
+                      <p:childTnLst>
+                        <p:par>
+                          <p:cTn id="8" fill="hold">
+                            <p:stCondLst>
+                              <p:cond delay="0"/>
+                            </p:stCondLst>
+                            <p:childTnLst>
+                              <p:par>
+                                <p:cTn id="9" presetID="1" presetClass="entr" presetSubtype="0" fill="hold" nodeType="clickEffect">
+                                  <p:stCondLst>
+                                    <p:cond delay="0"/>
+                                  </p:stCondLst>
+                                  <p:childTnLst>
+                                    <p:set>
+                                      <p:cBhvr>
+                                        <p:cTn id="10" dur="1" fill="hold">
+                                          <p:stCondLst>
+                                            <p:cond delay="0"/>
+                                          </p:stCondLst>
+                                        </p:cTn>
+                                        <p:tgtEl>
+                                          <p:spTgt spid="8"/>
+                                        </p:tgtEl>
+                                        <p:attrNameLst>
+                                          <p:attrName>style.visibility</p:attrName>
+                                        </p:attrNameLst>
+                                      </p:cBhvr>
+                                      <p:to>
+                                        <p:strVal val="visible"/>
+                                      </p:to>
+                                    </p:set>
+                                  </p:childTnLst>
+                                </p:cTn>
+                              </p:par>
+                            </p:childTnLst>
+                          </p:cTn>
+                        </p:par>
+                      </p:childTnLst>
+                    </p:cTn>
+                  </p:par>
+                  <p:par>
+                    <p:cTn id="11" fill="hold">
+                      <p:stCondLst>
+                        <p:cond delay="indefinite"/>
+                      </p:stCondLst>
+                      <p:childTnLst>
+                        <p:par>
+                          <p:cTn id="12" fill="hold">
+                            <p:stCondLst>
+                              <p:cond delay="0"/>
+                            </p:stCondLst>
+                            <p:childTnLst>
+                              <p:par>
+                                <p:cTn id="13" presetID="1" presetClass="entr" presetSubtype="0" fill="hold" nodeType="clickEffect">
+                                  <p:stCondLst>
+                                    <p:cond delay="0"/>
+                                  </p:stCondLst>
+                                  <p:childTnLst>
+                                    <p:set>
+                                      <p:cBhvr>
+                                        <p:cTn id="14" dur="1" fill="hold">
+                                          <p:stCondLst>
+                                            <p:cond delay="0"/>
+                                          </p:stCondLst>
+                                        </p:cTn>
+                                        <p:tgtEl>
+                                          <p:spTgt spid="9"/>
+                                        </p:tgtEl>
+                                        <p:attrNameLst>
+                                          <p:attrName>style.visibility</p:attrName>
+                                        </p:attrNameLst>
+                                      </p:cBhvr>
+                                      <p:to>
+                                        <p:strVal val="visible"/>
+                                      </p:to>
+                                    </p:set>
+                                  </p:childTnLst>
+                                </p:cTn>
+                              </p:par>
+                            </p:childTnLst>
+                          </p:cTn>
+                        </p:par>
+                      </p:childTnLst>
+                    </p:cTn>
+                  </p:par>
+                  <p:par>
+                    <p:cTn id="15" fill="hold">
+                      <p:stCondLst>
+                        <p:cond delay="indefinite"/>
+                      </p:stCondLst>
+                      <p:childTnLst>
+                        <p:par>
+                          <p:cTn id="16" fill="hold">
+                            <p:stCondLst>
+                              <p:cond delay="0"/>
+                            </p:stCondLst>
+                            <p:childTnLst>
+                              <p:par>
+                                <p:cTn id="17" presetID="1" presetClass="entr" presetSubtype="0" fill="hold" nodeType="clickEffect">
+                                  <p:stCondLst>
+                                    <p:cond delay="0"/>
+                                  </p:stCondLst>
+                                  <p:childTnLst>
+                                    <p:set>
+                                      <p:cBhvr>
+                                        <p:cTn id="18" dur="1" fill="hold">
+                                          <p:stCondLst>
+                                            <p:cond delay="0"/>
+                                          </p:stCondLst>
+                                        </p:cTn>
+                                        <p:tgtEl>
+                                          <p:spTgt spid="11"/>
+                                        </p:tgtEl>
+                                        <p:attrNameLst>
+                                          <p:attrName>style.visibility</p:attrName>
+                                        </p:attrNameLst>
+                                      </p:cBhvr>
+                                      <p:to>
+                                        <p:strVal val="visible"/>
+                                      </p:to>
+                                    </p:set>
+                                  </p:childTnLst>
+                                </p:cTn>
+                              </p:par>
+                            </p:childTnLst>
+                          </p:cTn>
+                        </p:par>
+                      </p:childTnLst>
+                    </p:cTn>
+                  </p:par>
+                  <p:par>
+                    <p:cTn id="19" fill="hold">
+                      <p:stCondLst>
+                        <p:cond delay="indefinite"/>
+                      </p:stCondLst>
+                      <p:childTnLst>
+                        <p:par>
+                          <p:cTn id="20" fill="hold">
+                            <p:stCondLst>
+                              <p:cond delay="0"/>
+                            </p:stCondLst>
+                            <p:childTnLst>
+                              <p:par>
+                                <p:cTn id="21" presetID="1" presetClass="entr" presetSubtype="0" fill="hold" grpId="0" nodeType="clickEffect">
+                                  <p:stCondLst>
+                                    <p:cond delay="0"/>
+                                  </p:stCondLst>
+                                  <p:childTnLst>
+                                    <p:set>
+                                      <p:cBhvr>
+                                        <p:cTn id="22" dur="1" fill="hold">
+                                          <p:stCondLst>
+                                            <p:cond delay="0"/>
+                                          </p:stCondLst>
+                                        </p:cTn>
+                                        <p:tgtEl>
+                                          <p:spTgt spid="12"/>
+                                        </p:tgtEl>
+                                        <p:attrNameLst>
+                                          <p:attrName>style.visibility</p:attrName>
+                                        </p:attrNameLst>
+                                      </p:cBhvr>
+                                      <p:to>
+                                        <p:strVal val="visible"/>
+                                      </p:to>
+                                    </p:set>
+                                  </p:childTnLst>
+                                </p:cTn>
+                              </p:par>
+                            </p:childTnLst>
+                          </p:cTn>
+                        </p:par>
+                      </p:childTnLst>
+                    </p:cTn>
+                  </p:par>
+                </p:childTnLst>
+              </p:cTn>
+              <p:prevCondLst>
+                <p:cond evt="onPrev" delay="0">
+                  <p:tgtEl>
+                    <p:sldTgt/>
+                  </p:tgtEl>
+                </p:cond>
+              </p:prevCondLst>
+              <p:nextCondLst>
+                <p:cond evt="onNext" delay="0">
+                  <p:tgtEl>
+                    <p:sldTgt/>
+                  </p:tgtEl>
+                </p:cond>
+              </p:nextCondLst>
+            </p:seq>
+          </p:childTnLst>
+        </p:cTn>
+      </p:par>
+    </p:tnLst>
+    <p:bldLst>
+      <p:bldP spid="12" grpId="0" animBg="1"/>
+    </p:bldLst>
+  </p:timing>
+</p:sld>
+</file>
+
+<file path=ppt/slides/slide4.xml><?xml version="1.0" encoding="utf-8"?>
+<p:sld xmlns:a="http://schemas.openxmlformats.org/drawingml/2006/main" xmlns:r="http://schemas.openxmlformats.org/officeDocument/2006/relationships" xmlns:p="http://schemas.openxmlformats.org/presentationml/2006/main">
+  <p:cSld>
     <p:bg>
       <p:bgPr>
         <a:solidFill>
@@ -6378,7 +6956,7 @@
       </p:grpSpPr>
       <p:sp>
         <p:nvSpPr>
-          <p:cNvPr id="21" name="Freeform 6">
+          <p:cNvPr id="28" name="Freeform 6">
             <a:extLst>
               <a:ext uri="{FF2B5EF4-FFF2-40B4-BE49-F238E27FC236}">
                 <a16:creationId xmlns:a16="http://schemas.microsoft.com/office/drawing/2014/main" id="{133F8CB7-795C-4272-9073-64D8CF97F220}"/>
@@ -6499,7 +7077,7 @@
       </p:sp>
       <p:sp>
         <p:nvSpPr>
-          <p:cNvPr id="22" name="Rectangle 16">
+          <p:cNvPr id="30" name="Rectangle 29">
             <a:extLst>
               <a:ext uri="{FF2B5EF4-FFF2-40B4-BE49-F238E27FC236}">
                 <a16:creationId xmlns:a16="http://schemas.microsoft.com/office/drawing/2014/main" id="{79277119-B941-4A45-9322-FA2BC135DE62}"/>
@@ -6562,7 +7140,7 @@
       </p:sp>
       <p:sp>
         <p:nvSpPr>
-          <p:cNvPr id="23" name="Freeform 23">
+          <p:cNvPr id="32" name="Freeform 23">
             <a:extLst>
               <a:ext uri="{FF2B5EF4-FFF2-40B4-BE49-F238E27FC236}">
                 <a16:creationId xmlns:a16="http://schemas.microsoft.com/office/drawing/2014/main" id="{DFDB457D-F372-428B-A10D-41080EF9382A}"/>
@@ -6796,18 +7374,30 @@
           <a:lstStyle/>
           <a:p>
             <a:r>
-              <a:rPr lang="en-US" sz="4400"/>
-              <a:t>Firstly, let’s refresh ourselves on IAM with an activity!!</a:t>
+              <a:rPr lang="en-US" sz="4400" dirty="0"/>
+              <a:t>Firstly, let’s </a:t>
+            </a:r>
+            <a:r>
+              <a:rPr lang="en-US" sz="4400" dirty="0">
+                <a:solidFill>
+                  <a:srgbClr val="92D050"/>
+                </a:solidFill>
+              </a:rPr>
+              <a:t>refresh</a:t>
+            </a:r>
+            <a:r>
+              <a:rPr lang="en-US" sz="4400" dirty="0"/>
+              <a:t> ourselves on IAM with an activity!!</a:t>
             </a:r>
           </a:p>
         </p:txBody>
       </p:sp>
       <p:pic>
         <p:nvPicPr>
-          <p:cNvPr id="4" name="Content Placeholder 3">
+          <p:cNvPr id="7" name="Content Placeholder 6" descr="A person wearing a suit and tie&#10;&#10;Description automatically generated">
             <a:extLst>
               <a:ext uri="{FF2B5EF4-FFF2-40B4-BE49-F238E27FC236}">
-                <a16:creationId xmlns:a16="http://schemas.microsoft.com/office/drawing/2014/main" id="{82510873-7184-E749-9C43-4399499D351C}"/>
+                <a16:creationId xmlns:a16="http://schemas.microsoft.com/office/drawing/2014/main" id="{6AF5AE99-D030-6B44-9D38-D59E54178787}"/>
               </a:ext>
             </a:extLst>
           </p:cNvPr>
@@ -6855,7 +7445,7 @@
 </p:sld>
 </file>
 
-<file path=ppt/slides/slide4.xml><?xml version="1.0" encoding="utf-8"?>
+<file path=ppt/slides/slide5.xml><?xml version="1.0" encoding="utf-8"?>
 <p:sld xmlns:a="http://schemas.openxmlformats.org/drawingml/2006/main" xmlns:r="http://schemas.openxmlformats.org/officeDocument/2006/relationships" xmlns:p="http://schemas.openxmlformats.org/presentationml/2006/main">
   <p:cSld>
     <p:bg>
@@ -6922,7 +7512,7 @@
 </p:sld>
 </file>
 
-<file path=ppt/slides/slide5.xml><?xml version="1.0" encoding="utf-8"?>
+<file path=ppt/slides/slide6.xml><?xml version="1.0" encoding="utf-8"?>
 <p:sld xmlns:a="http://schemas.openxmlformats.org/drawingml/2006/main" xmlns:r="http://schemas.openxmlformats.org/officeDocument/2006/relationships" xmlns:p="http://schemas.openxmlformats.org/presentationml/2006/main">
   <p:cSld>
     <p:bg>
@@ -7178,7 +7768,7 @@
 </p:sld>
 </file>
 
-<file path=ppt/slides/slide6.xml><?xml version="1.0" encoding="utf-8"?>
+<file path=ppt/slides/slide7.xml><?xml version="1.0" encoding="utf-8"?>
 <p:sld xmlns:a="http://schemas.openxmlformats.org/drawingml/2006/main" xmlns:r="http://schemas.openxmlformats.org/officeDocument/2006/relationships" xmlns:p="http://schemas.openxmlformats.org/presentationml/2006/main">
   <p:cSld>
     <p:spTree>
@@ -7408,7 +7998,7 @@
 </p:sld>
 </file>
 
-<file path=ppt/slides/slide7.xml><?xml version="1.0" encoding="utf-8"?>
+<file path=ppt/slides/slide8.xml><?xml version="1.0" encoding="utf-8"?>
 <p:sld xmlns:a="http://schemas.openxmlformats.org/drawingml/2006/main" xmlns:r="http://schemas.openxmlformats.org/officeDocument/2006/relationships" xmlns:p="http://schemas.openxmlformats.org/presentationml/2006/main">
   <p:cSld>
     <p:spTree>

</xml_diff>